<commit_message>
Update File Jupyter and Seaborn
</commit_message>
<xml_diff>
--- a/Tugas 1 Pengantar Python (Bayu Yunan Toro_4IA17_511415304).pptx
+++ b/Tugas 1 Pengantar Python (Bayu Yunan Toro_4IA17_511415304).pptx
@@ -28,7 +28,16 @@
     <p:sldId id="273" r:id="rId21"/>
     <p:sldId id="274" r:id="rId22"/>
     <p:sldId id="275" r:id="rId23"/>
-    <p:sldId id="276" r:id="rId24"/>
+    <p:sldId id="277" r:id="rId24"/>
+    <p:sldId id="278" r:id="rId25"/>
+    <p:sldId id="279" r:id="rId26"/>
+    <p:sldId id="280" r:id="rId27"/>
+    <p:sldId id="281" r:id="rId28"/>
+    <p:sldId id="282" r:id="rId29"/>
+    <p:sldId id="283" r:id="rId30"/>
+    <p:sldId id="284" r:id="rId31"/>
+    <p:sldId id="285" r:id="rId32"/>
+    <p:sldId id="276" r:id="rId33"/>
   </p:sldIdLst>
   <p:sldSz cx="12192000" cy="6858000"/>
   <p:notesSz cx="7103745" cy="10234295"/>
@@ -5545,10 +5554,10 @@
           <a:bodyPr/>
           <a:p>
             <a:r>
-              <a:rPr lang="en-ID" altLang="en-US" sz="5400" b="1"/>
-              <a:t>Sumber</a:t>
-            </a:r>
-            <a:endParaRPr lang="en-ID" altLang="en-US" sz="5400" b="1"/>
+              <a:rPr lang="en-ID" altLang="en-US" sz="4800" b="1"/>
+              <a:t>Instalasi Jupyter dengan Anaconda</a:t>
+            </a:r>
+            <a:endParaRPr lang="en-ID" altLang="en-US" sz="4800" b="1"/>
           </a:p>
         </p:txBody>
       </p:sp>
@@ -5571,49 +5580,647 @@
         <p:txBody>
           <a:bodyPr/>
           <a:p>
-            <a:pPr algn="just"/>
-            <a:r>
-              <a:rPr lang="en-US" sz="2500"/>
-              <a:t>http://sakti.github.io/python101/struktur_data.html</a:t>
-            </a:r>
-            <a:endParaRPr lang="en-US" sz="2500"/>
-          </a:p>
-          <a:p>
-            <a:pPr algn="just"/>
-            <a:r>
-              <a:rPr lang="en-US" sz="2500">
-                <a:sym typeface="+mn-ea"/>
-              </a:rPr>
-              <a:t>https://www.duniailkom.com/tutorial-belajar-python-cara-mendownload-dan-menginstall-python/</a:t>
-            </a:r>
-            <a:endParaRPr lang="en-US" sz="2500"/>
-          </a:p>
-          <a:p>
-            <a:pPr algn="just"/>
-            <a:r>
-              <a:rPr lang="en-US" sz="2500">
-                <a:sym typeface="+mn-ea"/>
-              </a:rPr>
-              <a:t>https://daengweb.id/berkenalan-dengan-python</a:t>
-            </a:r>
-            <a:endParaRPr lang="en-US" sz="2500"/>
-          </a:p>
-          <a:p>
-            <a:pPr algn="just"/>
-            <a:r>
-              <a:rPr lang="en-US" sz="2500">
-                <a:sym typeface="+mn-ea"/>
-              </a:rPr>
-              <a:t>https://github.com/ardeabagas22</a:t>
-            </a:r>
-            <a:endParaRPr lang="en-US" sz="2500"/>
-          </a:p>
-          <a:p>
-            <a:pPr algn="just"/>
-            <a:endParaRPr lang="en-US" sz="2500"/>
-          </a:p>
-        </p:txBody>
-      </p:sp>
+            <a:pPr marL="0" indent="0" algn="just">
+              <a:buNone/>
+            </a:pPr>
+            <a:r>
+              <a:rPr lang="en-ID" altLang="en-US" sz="2000"/>
+              <a:t>	</a:t>
+            </a:r>
+            <a:r>
+              <a:rPr lang="en-US" sz="2000"/>
+              <a:t>Berdasarkan Informasi dari Wikipedia, Anaconda adalah aplikasi open-source yang didistribusikan dengan bahasa pemrograman Python dan R untuk data science dan aplikasi yang berhubungan dengan machine learning (large-scale data processing, predictive analytics, scientific computing). Bertujuan untuk menyederhanakan package management dan deployment. Package versions dikelola oleh package management system conda. Anaconda digunakan oleh lebih dari 6 juta pengguna, dan mencakup lebih dari 250 paket data science populer yang cocok untuk Windows, Linux dan MacOS.</a:t>
+            </a:r>
+            <a:endParaRPr lang="en-US" sz="2000"/>
+          </a:p>
+        </p:txBody>
+      </p:sp>
+    </p:spTree>
+  </p:cSld>
+  <p:clrMapOvr>
+    <a:masterClrMapping/>
+  </p:clrMapOvr>
+</p:sld>
+</file>
+
+<file path=ppt/slides/slide22.xml><?xml version="1.0" encoding="utf-8"?>
+<p:sld xmlns:a="http://schemas.openxmlformats.org/drawingml/2006/main" xmlns:r="http://schemas.openxmlformats.org/officeDocument/2006/relationships" xmlns:p="http://schemas.openxmlformats.org/presentationml/2006/main">
+  <p:cSld>
+    <p:spTree>
+      <p:nvGrpSpPr>
+        <p:cNvPr id="1" name=""/>
+        <p:cNvGrpSpPr/>
+        <p:nvPr/>
+      </p:nvGrpSpPr>
+      <p:grpSpPr/>
+      <p:sp>
+        <p:nvSpPr>
+          <p:cNvPr id="2" name="Title 1"/>
+          <p:cNvSpPr>
+            <a:spLocks noGrp="1"/>
+          </p:cNvSpPr>
+          <p:nvPr>
+            <p:ph type="title"/>
+          </p:nvPr>
+        </p:nvSpPr>
+        <p:spPr/>
+        <p:txBody>
+          <a:bodyPr/>
+          <a:p>
+            <a:endParaRPr lang="en-US"/>
+          </a:p>
+        </p:txBody>
+      </p:sp>
+      <p:sp>
+        <p:nvSpPr>
+          <p:cNvPr id="3" name="Content Placeholder 2"/>
+          <p:cNvSpPr>
+            <a:spLocks noGrp="1"/>
+          </p:cNvSpPr>
+          <p:nvPr>
+            <p:ph sz="half" idx="1"/>
+          </p:nvPr>
+        </p:nvSpPr>
+        <p:spPr>
+          <a:xfrm>
+            <a:off x="609600" y="1600200"/>
+            <a:ext cx="10972800" cy="4526280"/>
+          </a:xfrm>
+        </p:spPr>
+        <p:txBody>
+          <a:bodyPr/>
+          <a:p>
+            <a:r>
+              <a:rPr lang="en-US" sz="2000"/>
+              <a:t>Pertama, kita download terlebih dahulu Anaconda. Direkomendasikan untuk mendownload anaconda yang menggunakan python versi 3 keatas</a:t>
+            </a:r>
+            <a:endParaRPr lang="en-US" sz="2000"/>
+          </a:p>
+          <a:p>
+            <a:pPr marL="0" indent="0">
+              <a:buNone/>
+            </a:pPr>
+            <a:endParaRPr lang="en-US" sz="2000"/>
+          </a:p>
+          <a:p>
+            <a:r>
+              <a:rPr lang="en-US" sz="2000"/>
+              <a:t>Kedua, Install hasil yang telah kita download tersebut dan ikuti langkah-langkahnya sesuai gambar dibawah ini :</a:t>
+            </a:r>
+            <a:endParaRPr lang="en-US" sz="2000"/>
+          </a:p>
+        </p:txBody>
+      </p:sp>
+    </p:spTree>
+  </p:cSld>
+  <p:clrMapOvr>
+    <a:masterClrMapping/>
+  </p:clrMapOvr>
+</p:sld>
+</file>
+
+<file path=ppt/slides/slide23.xml><?xml version="1.0" encoding="utf-8"?>
+<p:sld xmlns:a="http://schemas.openxmlformats.org/drawingml/2006/main" xmlns:r="http://schemas.openxmlformats.org/officeDocument/2006/relationships" xmlns:p="http://schemas.openxmlformats.org/presentationml/2006/main">
+  <p:cSld>
+    <p:spTree>
+      <p:nvGrpSpPr>
+        <p:cNvPr id="1" name=""/>
+        <p:cNvGrpSpPr/>
+        <p:nvPr/>
+      </p:nvGrpSpPr>
+      <p:grpSpPr/>
+      <p:sp>
+        <p:nvSpPr>
+          <p:cNvPr id="2" name="Title 1"/>
+          <p:cNvSpPr>
+            <a:spLocks noGrp="1"/>
+          </p:cNvSpPr>
+          <p:nvPr>
+            <p:ph type="title"/>
+          </p:nvPr>
+        </p:nvSpPr>
+        <p:spPr/>
+        <p:txBody>
+          <a:bodyPr/>
+          <a:p>
+            <a:endParaRPr lang="en-US"/>
+          </a:p>
+        </p:txBody>
+      </p:sp>
+      <p:pic>
+        <p:nvPicPr>
+          <p:cNvPr id="5" name="Content Placeholder 4"/>
+          <p:cNvPicPr>
+            <a:picLocks noChangeAspect="1"/>
+          </p:cNvPicPr>
+          <p:nvPr>
+            <p:ph sz="half" idx="1"/>
+          </p:nvPr>
+        </p:nvPicPr>
+        <p:blipFill>
+          <a:blip r:embed="rId1"/>
+          <a:stretch>
+            <a:fillRect/>
+          </a:stretch>
+        </p:blipFill>
+        <p:spPr>
+          <a:xfrm>
+            <a:off x="609600" y="2204085"/>
+            <a:ext cx="10972800" cy="3663950"/>
+          </a:xfrm>
+          <a:prstGeom prst="rect">
+            <a:avLst/>
+          </a:prstGeom>
+        </p:spPr>
+      </p:pic>
+    </p:spTree>
+  </p:cSld>
+  <p:clrMapOvr>
+    <a:masterClrMapping/>
+  </p:clrMapOvr>
+</p:sld>
+</file>
+
+<file path=ppt/slides/slide24.xml><?xml version="1.0" encoding="utf-8"?>
+<p:sld xmlns:a="http://schemas.openxmlformats.org/drawingml/2006/main" xmlns:r="http://schemas.openxmlformats.org/officeDocument/2006/relationships" xmlns:p="http://schemas.openxmlformats.org/presentationml/2006/main">
+  <p:cSld>
+    <p:spTree>
+      <p:nvGrpSpPr>
+        <p:cNvPr id="1" name=""/>
+        <p:cNvGrpSpPr/>
+        <p:nvPr/>
+      </p:nvGrpSpPr>
+      <p:grpSpPr/>
+      <p:sp>
+        <p:nvSpPr>
+          <p:cNvPr id="2" name="Title 1"/>
+          <p:cNvSpPr>
+            <a:spLocks noGrp="1"/>
+          </p:cNvSpPr>
+          <p:nvPr>
+            <p:ph type="title"/>
+          </p:nvPr>
+        </p:nvSpPr>
+        <p:spPr/>
+        <p:txBody>
+          <a:bodyPr/>
+          <a:p>
+            <a:endParaRPr lang="en-US"/>
+          </a:p>
+        </p:txBody>
+      </p:sp>
+      <p:pic>
+        <p:nvPicPr>
+          <p:cNvPr id="5" name="Content Placeholder 4"/>
+          <p:cNvPicPr>
+            <a:picLocks noChangeAspect="1"/>
+          </p:cNvPicPr>
+          <p:nvPr>
+            <p:ph sz="half" idx="1"/>
+          </p:nvPr>
+        </p:nvPicPr>
+        <p:blipFill>
+          <a:blip r:embed="rId1"/>
+          <a:stretch>
+            <a:fillRect/>
+          </a:stretch>
+        </p:blipFill>
+        <p:spPr>
+          <a:xfrm>
+            <a:off x="633730" y="2081530"/>
+            <a:ext cx="10948670" cy="3531235"/>
+          </a:xfrm>
+          <a:prstGeom prst="rect">
+            <a:avLst/>
+          </a:prstGeom>
+        </p:spPr>
+      </p:pic>
+    </p:spTree>
+  </p:cSld>
+  <p:clrMapOvr>
+    <a:masterClrMapping/>
+  </p:clrMapOvr>
+</p:sld>
+</file>
+
+<file path=ppt/slides/slide25.xml><?xml version="1.0" encoding="utf-8"?>
+<p:sld xmlns:a="http://schemas.openxmlformats.org/drawingml/2006/main" xmlns:r="http://schemas.openxmlformats.org/officeDocument/2006/relationships" xmlns:p="http://schemas.openxmlformats.org/presentationml/2006/main">
+  <p:cSld>
+    <p:spTree>
+      <p:nvGrpSpPr>
+        <p:cNvPr id="1" name=""/>
+        <p:cNvGrpSpPr/>
+        <p:nvPr/>
+      </p:nvGrpSpPr>
+      <p:grpSpPr/>
+      <p:sp>
+        <p:nvSpPr>
+          <p:cNvPr id="2" name="Title 1"/>
+          <p:cNvSpPr>
+            <a:spLocks noGrp="1"/>
+          </p:cNvSpPr>
+          <p:nvPr>
+            <p:ph type="title"/>
+          </p:nvPr>
+        </p:nvSpPr>
+        <p:spPr/>
+        <p:txBody>
+          <a:bodyPr/>
+          <a:p>
+            <a:endParaRPr lang="en-US"/>
+          </a:p>
+        </p:txBody>
+      </p:sp>
+      <p:pic>
+        <p:nvPicPr>
+          <p:cNvPr id="5" name="Content Placeholder 4"/>
+          <p:cNvPicPr>
+            <a:picLocks noChangeAspect="1"/>
+          </p:cNvPicPr>
+          <p:nvPr>
+            <p:ph sz="half" idx="1"/>
+          </p:nvPr>
+        </p:nvPicPr>
+        <p:blipFill>
+          <a:blip r:embed="rId1"/>
+          <a:stretch>
+            <a:fillRect/>
+          </a:stretch>
+        </p:blipFill>
+        <p:spPr>
+          <a:xfrm>
+            <a:off x="657860" y="2111375"/>
+            <a:ext cx="10924540" cy="3354070"/>
+          </a:xfrm>
+          <a:prstGeom prst="rect">
+            <a:avLst/>
+          </a:prstGeom>
+        </p:spPr>
+      </p:pic>
+    </p:spTree>
+  </p:cSld>
+  <p:clrMapOvr>
+    <a:masterClrMapping/>
+  </p:clrMapOvr>
+</p:sld>
+</file>
+
+<file path=ppt/slides/slide26.xml><?xml version="1.0" encoding="utf-8"?>
+<p:sld xmlns:a="http://schemas.openxmlformats.org/drawingml/2006/main" xmlns:r="http://schemas.openxmlformats.org/officeDocument/2006/relationships" xmlns:p="http://schemas.openxmlformats.org/presentationml/2006/main">
+  <p:cSld>
+    <p:spTree>
+      <p:nvGrpSpPr>
+        <p:cNvPr id="1" name=""/>
+        <p:cNvGrpSpPr/>
+        <p:nvPr/>
+      </p:nvGrpSpPr>
+      <p:grpSpPr/>
+      <p:sp>
+        <p:nvSpPr>
+          <p:cNvPr id="2" name="Title 1"/>
+          <p:cNvSpPr>
+            <a:spLocks noGrp="1"/>
+          </p:cNvSpPr>
+          <p:nvPr>
+            <p:ph type="title"/>
+          </p:nvPr>
+        </p:nvSpPr>
+        <p:spPr/>
+        <p:txBody>
+          <a:bodyPr/>
+          <a:p>
+            <a:r>
+              <a:rPr lang="en-ID" altLang="en-US" sz="4800" b="1"/>
+              <a:t>Instalasi Jupyter dengan PIP</a:t>
+            </a:r>
+            <a:endParaRPr lang="en-ID" altLang="en-US" sz="4800" b="1"/>
+          </a:p>
+        </p:txBody>
+      </p:sp>
+      <p:sp>
+        <p:nvSpPr>
+          <p:cNvPr id="3" name="Content Placeholder 2"/>
+          <p:cNvSpPr>
+            <a:spLocks noGrp="1"/>
+          </p:cNvSpPr>
+          <p:nvPr>
+            <p:ph sz="half" idx="1"/>
+          </p:nvPr>
+        </p:nvSpPr>
+        <p:spPr>
+          <a:xfrm>
+            <a:off x="609600" y="1600200"/>
+            <a:ext cx="10972165" cy="4526280"/>
+          </a:xfrm>
+        </p:spPr>
+        <p:txBody>
+          <a:bodyPr/>
+          <a:p>
+            <a:pPr marL="0" indent="0">
+              <a:buNone/>
+            </a:pPr>
+            <a:r>
+              <a:rPr lang="en-ID" altLang="en-US" sz="2000"/>
+              <a:t>	</a:t>
+            </a:r>
+            <a:r>
+              <a:rPr lang="en-US" sz="2000"/>
+              <a:t>Untuk melakukan instalasi jupyter di windows menggunakan pip, pastikan terlebih dahulu telah mellakukan instalasi python di windows. Setelah terinstall pythonnya, silahkan jalankan command dibawah ini </a:t>
+            </a:r>
+            <a:r>
+              <a:rPr lang="en-ID" altLang="en-US" sz="2000"/>
+              <a:t>:</a:t>
+            </a:r>
+            <a:endParaRPr lang="en-ID" altLang="en-US" sz="2000"/>
+          </a:p>
+        </p:txBody>
+      </p:sp>
+      <p:pic>
+        <p:nvPicPr>
+          <p:cNvPr id="5" name="Content Placeholder 4"/>
+          <p:cNvPicPr>
+            <a:picLocks noChangeAspect="1"/>
+          </p:cNvPicPr>
+          <p:nvPr>
+            <p:ph sz="half" idx="2"/>
+          </p:nvPr>
+        </p:nvPicPr>
+        <p:blipFill>
+          <a:blip r:embed="rId1"/>
+          <a:stretch>
+            <a:fillRect/>
+          </a:stretch>
+        </p:blipFill>
+        <p:spPr>
+          <a:xfrm>
+            <a:off x="3493770" y="3277870"/>
+            <a:ext cx="5204460" cy="1503680"/>
+          </a:xfrm>
+          <a:prstGeom prst="rect">
+            <a:avLst/>
+          </a:prstGeom>
+          <a:noFill/>
+          <a:ln w="9525">
+            <a:noFill/>
+          </a:ln>
+        </p:spPr>
+      </p:pic>
+    </p:spTree>
+  </p:cSld>
+  <p:clrMapOvr>
+    <a:masterClrMapping/>
+  </p:clrMapOvr>
+</p:sld>
+</file>
+
+<file path=ppt/slides/slide27.xml><?xml version="1.0" encoding="utf-8"?>
+<p:sld xmlns:a="http://schemas.openxmlformats.org/drawingml/2006/main" xmlns:r="http://schemas.openxmlformats.org/officeDocument/2006/relationships" xmlns:p="http://schemas.openxmlformats.org/presentationml/2006/main">
+  <p:cSld>
+    <p:spTree>
+      <p:nvGrpSpPr>
+        <p:cNvPr id="1" name=""/>
+        <p:cNvGrpSpPr/>
+        <p:nvPr/>
+      </p:nvGrpSpPr>
+      <p:grpSpPr/>
+      <p:sp>
+        <p:nvSpPr>
+          <p:cNvPr id="9" name="Title 8"/>
+          <p:cNvSpPr>
+            <a:spLocks noGrp="1"/>
+          </p:cNvSpPr>
+          <p:nvPr>
+            <p:ph type="title"/>
+          </p:nvPr>
+        </p:nvSpPr>
+        <p:spPr/>
+        <p:txBody>
+          <a:bodyPr/>
+          <a:p>
+            <a:endParaRPr lang="en-US"/>
+          </a:p>
+        </p:txBody>
+      </p:sp>
+      <p:sp>
+        <p:nvSpPr>
+          <p:cNvPr id="6" name="Content Placeholder 5"/>
+          <p:cNvSpPr/>
+          <p:nvPr>
+            <p:ph sz="half" idx="1"/>
+          </p:nvPr>
+        </p:nvSpPr>
+        <p:spPr>
+          <a:xfrm>
+            <a:off x="609600" y="1600200"/>
+            <a:ext cx="10972800" cy="4526280"/>
+          </a:xfrm>
+        </p:spPr>
+        <p:txBody>
+          <a:bodyPr/>
+          <a:p>
+            <a:pPr marL="0" indent="0" algn="just">
+              <a:buNone/>
+            </a:pPr>
+            <a:r>
+              <a:rPr lang="en-ID" altLang="en-US" sz="2000"/>
+              <a:t>	</a:t>
+            </a:r>
+            <a:r>
+              <a:rPr lang="en-US" sz="2000"/>
+              <a:t>Setelah melakukan instalasi jupyter di windows, pastikan tidak ada error saat melakukan instalasi. Untuk mengecek jupyter telah terinstall, bisa menggunakan command pada CMD pada windows atau Terminal di Linux/MacOS seperti dibawah ini </a:t>
+            </a:r>
+            <a:r>
+              <a:rPr lang="en-ID" altLang="en-US" sz="2000"/>
+              <a:t>:</a:t>
+            </a:r>
+            <a:endParaRPr lang="en-ID" altLang="en-US" sz="2000"/>
+          </a:p>
+        </p:txBody>
+      </p:sp>
+      <p:pic>
+        <p:nvPicPr>
+          <p:cNvPr id="8" name="Content Placeholder 7"/>
+          <p:cNvPicPr>
+            <a:picLocks noChangeAspect="1"/>
+          </p:cNvPicPr>
+          <p:nvPr>
+            <p:ph sz="half" idx="2"/>
+          </p:nvPr>
+        </p:nvPicPr>
+        <p:blipFill>
+          <a:blip r:embed="rId1"/>
+          <a:stretch>
+            <a:fillRect/>
+          </a:stretch>
+        </p:blipFill>
+        <p:spPr>
+          <a:xfrm>
+            <a:off x="2542540" y="2626995"/>
+            <a:ext cx="6579870" cy="4058920"/>
+          </a:xfrm>
+          <a:prstGeom prst="rect">
+            <a:avLst/>
+          </a:prstGeom>
+        </p:spPr>
+      </p:pic>
+    </p:spTree>
+  </p:cSld>
+  <p:clrMapOvr>
+    <a:masterClrMapping/>
+  </p:clrMapOvr>
+</p:sld>
+</file>
+
+<file path=ppt/slides/slide28.xml><?xml version="1.0" encoding="utf-8"?>
+<p:sld xmlns:a="http://schemas.openxmlformats.org/drawingml/2006/main" xmlns:r="http://schemas.openxmlformats.org/officeDocument/2006/relationships" xmlns:p="http://schemas.openxmlformats.org/presentationml/2006/main">
+  <p:cSld>
+    <p:spTree>
+      <p:nvGrpSpPr>
+        <p:cNvPr id="1" name=""/>
+        <p:cNvGrpSpPr/>
+        <p:nvPr/>
+      </p:nvGrpSpPr>
+      <p:grpSpPr/>
+      <p:sp>
+        <p:nvSpPr>
+          <p:cNvPr id="2" name="Title 1"/>
+          <p:cNvSpPr>
+            <a:spLocks noGrp="1"/>
+          </p:cNvSpPr>
+          <p:nvPr>
+            <p:ph type="title"/>
+          </p:nvPr>
+        </p:nvSpPr>
+        <p:spPr/>
+        <p:txBody>
+          <a:bodyPr/>
+          <a:p>
+            <a:endParaRPr lang="en-US"/>
+          </a:p>
+        </p:txBody>
+      </p:sp>
+      <p:pic>
+        <p:nvPicPr>
+          <p:cNvPr id="5" name="Content Placeholder 4"/>
+          <p:cNvPicPr>
+            <a:picLocks noChangeAspect="1"/>
+          </p:cNvPicPr>
+          <p:nvPr>
+            <p:ph sz="half" idx="1"/>
+          </p:nvPr>
+        </p:nvPicPr>
+        <p:blipFill>
+          <a:blip r:embed="rId1"/>
+          <a:stretch>
+            <a:fillRect/>
+          </a:stretch>
+        </p:blipFill>
+        <p:spPr>
+          <a:xfrm>
+            <a:off x="2927350" y="1834515"/>
+            <a:ext cx="6336665" cy="3921125"/>
+          </a:xfrm>
+          <a:prstGeom prst="rect">
+            <a:avLst/>
+          </a:prstGeom>
+        </p:spPr>
+      </p:pic>
+    </p:spTree>
+  </p:cSld>
+  <p:clrMapOvr>
+    <a:masterClrMapping/>
+  </p:clrMapOvr>
+</p:sld>
+</file>
+
+<file path=ppt/slides/slide29.xml><?xml version="1.0" encoding="utf-8"?>
+<p:sld xmlns:a="http://schemas.openxmlformats.org/drawingml/2006/main" xmlns:r="http://schemas.openxmlformats.org/officeDocument/2006/relationships" xmlns:p="http://schemas.openxmlformats.org/presentationml/2006/main">
+  <p:cSld>
+    <p:spTree>
+      <p:nvGrpSpPr>
+        <p:cNvPr id="1" name=""/>
+        <p:cNvGrpSpPr/>
+        <p:nvPr/>
+      </p:nvGrpSpPr>
+      <p:grpSpPr/>
+      <p:sp>
+        <p:nvSpPr>
+          <p:cNvPr id="6" name="Title 5"/>
+          <p:cNvSpPr>
+            <a:spLocks noGrp="1"/>
+          </p:cNvSpPr>
+          <p:nvPr>
+            <p:ph type="title"/>
+          </p:nvPr>
+        </p:nvSpPr>
+        <p:spPr/>
+        <p:txBody>
+          <a:bodyPr/>
+          <a:p>
+            <a:endParaRPr lang="en-US"/>
+          </a:p>
+        </p:txBody>
+      </p:sp>
+      <p:sp>
+        <p:nvSpPr>
+          <p:cNvPr id="3" name="Content Placeholder 2"/>
+          <p:cNvSpPr>
+            <a:spLocks noGrp="1"/>
+          </p:cNvSpPr>
+          <p:nvPr>
+            <p:ph sz="half" idx="1"/>
+          </p:nvPr>
+        </p:nvSpPr>
+        <p:spPr>
+          <a:xfrm>
+            <a:off x="609600" y="1600200"/>
+            <a:ext cx="10972165" cy="4526280"/>
+          </a:xfrm>
+        </p:spPr>
+        <p:txBody>
+          <a:bodyPr/>
+          <a:p>
+            <a:pPr marL="0" indent="0" algn="just">
+              <a:buNone/>
+            </a:pPr>
+            <a:r>
+              <a:rPr lang="en-ID" altLang="en-US" sz="2000"/>
+              <a:t>	</a:t>
+            </a:r>
+            <a:r>
+              <a:rPr lang="en-US" sz="2000"/>
+              <a:t>Untuk membuat Notebook dengan python, bisa memilih New -&gt; Python 3 lalu isikan command yang ingin diberikan </a:t>
+            </a:r>
+            <a:endParaRPr lang="en-ID" altLang="en-US" sz="2000"/>
+          </a:p>
+        </p:txBody>
+      </p:sp>
+      <p:pic>
+        <p:nvPicPr>
+          <p:cNvPr id="5" name="Content Placeholder 4"/>
+          <p:cNvPicPr>
+            <a:picLocks noChangeAspect="1"/>
+          </p:cNvPicPr>
+          <p:nvPr>
+            <p:ph sz="half" idx="2"/>
+          </p:nvPr>
+        </p:nvPicPr>
+        <p:blipFill>
+          <a:blip r:embed="rId1"/>
+          <a:stretch>
+            <a:fillRect/>
+          </a:stretch>
+        </p:blipFill>
+        <p:spPr>
+          <a:xfrm>
+            <a:off x="3115945" y="2375535"/>
+            <a:ext cx="5959475" cy="3750945"/>
+          </a:xfrm>
+          <a:prstGeom prst="rect">
+            <a:avLst/>
+          </a:prstGeom>
+        </p:spPr>
+      </p:pic>
     </p:spTree>
   </p:cSld>
   <p:clrMapOvr>
@@ -5906,6 +6513,134 @@
           </a:prstGeom>
         </p:spPr>
       </p:pic>
+    </p:spTree>
+  </p:cSld>
+  <p:clrMapOvr>
+    <a:masterClrMapping/>
+  </p:clrMapOvr>
+</p:sld>
+</file>
+
+<file path=ppt/slides/slide30.xml><?xml version="1.0" encoding="utf-8"?>
+<p:sld xmlns:a="http://schemas.openxmlformats.org/drawingml/2006/main" xmlns:r="http://schemas.openxmlformats.org/officeDocument/2006/relationships" xmlns:p="http://schemas.openxmlformats.org/presentationml/2006/main">
+  <p:cSld>
+    <p:spTree>
+      <p:nvGrpSpPr>
+        <p:cNvPr id="1" name=""/>
+        <p:cNvGrpSpPr/>
+        <p:nvPr/>
+      </p:nvGrpSpPr>
+      <p:grpSpPr/>
+      <p:sp>
+        <p:nvSpPr>
+          <p:cNvPr id="2" name="Title 1"/>
+          <p:cNvSpPr>
+            <a:spLocks noGrp="1"/>
+          </p:cNvSpPr>
+          <p:nvPr>
+            <p:ph type="title"/>
+          </p:nvPr>
+        </p:nvSpPr>
+        <p:spPr/>
+        <p:txBody>
+          <a:bodyPr/>
+          <a:p>
+            <a:r>
+              <a:rPr lang="en-ID" altLang="en-US" sz="5400" b="1"/>
+              <a:t>Sumber</a:t>
+            </a:r>
+            <a:endParaRPr lang="en-ID" altLang="en-US" sz="5400" b="1"/>
+          </a:p>
+        </p:txBody>
+      </p:sp>
+      <p:sp>
+        <p:nvSpPr>
+          <p:cNvPr id="3" name="Content Placeholder 2"/>
+          <p:cNvSpPr>
+            <a:spLocks noGrp="1"/>
+          </p:cNvSpPr>
+          <p:nvPr>
+            <p:ph sz="half" idx="1"/>
+          </p:nvPr>
+        </p:nvSpPr>
+        <p:spPr>
+          <a:xfrm>
+            <a:off x="609600" y="1600200"/>
+            <a:ext cx="10972800" cy="4526280"/>
+          </a:xfrm>
+        </p:spPr>
+        <p:txBody>
+          <a:bodyPr/>
+          <a:p>
+            <a:pPr algn="just"/>
+            <a:r>
+              <a:rPr lang="en-US" sz="2500"/>
+              <a:t>http://sakti.github.io/python101/struktur_data.html</a:t>
+            </a:r>
+            <a:endParaRPr lang="en-US" sz="2500"/>
+          </a:p>
+          <a:p>
+            <a:pPr algn="just"/>
+            <a:r>
+              <a:rPr lang="en-US" sz="2500">
+                <a:sym typeface="+mn-ea"/>
+              </a:rPr>
+              <a:t>https://www.duniailkom.com/tutorial-belajar-python-cara-mendownload-dan-menginstall-python/</a:t>
+            </a:r>
+            <a:endParaRPr lang="en-US" sz="2500"/>
+          </a:p>
+          <a:p>
+            <a:pPr algn="just"/>
+            <a:r>
+              <a:rPr lang="en-US" sz="2500">
+                <a:sym typeface="+mn-ea"/>
+              </a:rPr>
+              <a:t>https://daengweb.id/berkenalan-dengan-python</a:t>
+            </a:r>
+            <a:endParaRPr lang="en-US" sz="2500"/>
+          </a:p>
+          <a:p>
+            <a:pPr algn="just"/>
+            <a:r>
+              <a:rPr lang="en-US" sz="2500">
+                <a:sym typeface="+mn-ea"/>
+              </a:rPr>
+              <a:t>https://github.com/ardeabagas22</a:t>
+            </a:r>
+            <a:endParaRPr lang="en-US" sz="2500">
+              <a:sym typeface="+mn-ea"/>
+            </a:endParaRPr>
+          </a:p>
+          <a:p>
+            <a:pPr algn="just"/>
+            <a:r>
+              <a:rPr lang="en-US" sz="2500"/>
+              <a:t>http://jupyter.org/</a:t>
+            </a:r>
+            <a:endParaRPr lang="en-US" sz="2500"/>
+          </a:p>
+          <a:p>
+            <a:pPr algn="just"/>
+            <a:r>
+              <a:rPr lang="en-US" sz="2500"/>
+              <a:t>https://en.wikipedia.org/wiki/Anaconda_(Python_distribution)</a:t>
+            </a:r>
+            <a:endParaRPr lang="en-US" sz="2500"/>
+          </a:p>
+          <a:p>
+            <a:pPr algn="just"/>
+            <a:r>
+              <a:rPr lang="en-US" sz="2500"/>
+              <a:t>https://beril.id/instalasi-jupyter-di-windows/</a:t>
+            </a:r>
+            <a:endParaRPr lang="en-US" sz="2500"/>
+          </a:p>
+          <a:p>
+            <a:pPr algn="just"/>
+            <a:endParaRPr lang="en-US" sz="2500"/>
+          </a:p>
+        </p:txBody>
+      </p:sp>
     </p:spTree>
   </p:cSld>
   <p:clrMapOvr>

</xml_diff>